<commit_message>
Update to Home page slide
</commit_message>
<xml_diff>
--- a/Presentation/Home Page slide.pptx
+++ b/Presentation/Home Page slide.pptx
@@ -104,7 +104,152 @@
       </a:defRPr>
     </a:lvl9pPr>
   </p:defaultTextStyle>
+  <p:extLst>
+    <p:ext uri="{EFAFB233-063F-42B5-8137-9DF3F51BA10A}">
+      <p15:sldGuideLst xmlns:p15="http://schemas.microsoft.com/office/powerpoint/2012/main"/>
+    </p:ext>
+  </p:extLst>
 </p:presentation>
+</file>
+
+<file path=ppt/charts/chart1.xml><?xml version="1.0" encoding="utf-8"?>
+<c:chartSpace xmlns:c="http://schemas.openxmlformats.org/drawingml/2006/chart" xmlns:a="http://schemas.openxmlformats.org/drawingml/2006/main" xmlns:r="http://schemas.openxmlformats.org/officeDocument/2006/relationships">
+  <c:date1904 val="0"/>
+  <c:lang val="en-US"/>
+  <c:roundedCorners val="0"/>
+  <mc:AlternateContent xmlns:mc="http://schemas.openxmlformats.org/markup-compatibility/2006">
+    <mc:Choice xmlns:c14="http://schemas.microsoft.com/office/drawing/2007/8/2/chart" Requires="c14">
+      <c14:style val="102"/>
+    </mc:Choice>
+    <mc:Fallback>
+      <c:style val="2"/>
+    </mc:Fallback>
+  </mc:AlternateContent>
+  <c:chart>
+    <c:autoTitleDeleted val="0"/>
+    <c:plotArea>
+      <c:layout>
+        <c:manualLayout>
+          <c:layoutTarget val="inner"/>
+          <c:xMode val="edge"/>
+          <c:yMode val="edge"/>
+          <c:x val="9.4326994913746465E-2"/>
+          <c:y val="7.958482473374795E-2"/>
+          <c:w val="0.8777847396778039"/>
+          <c:h val="0.78039922023113761"/>
+        </c:manualLayout>
+      </c:layout>
+      <c:barChart>
+        <c:barDir val="col"/>
+        <c:grouping val="clustered"/>
+        <c:varyColors val="0"/>
+        <c:ser>
+          <c:idx val="0"/>
+          <c:order val="0"/>
+          <c:invertIfNegative val="0"/>
+          <c:cat>
+            <c:strRef>
+              <c:f>'Test Cases'!$T$25:$T$29</c:f>
+              <c:strCache>
+                <c:ptCount val="5"/>
+                <c:pt idx="0">
+                  <c:v>Minor </c:v>
+                </c:pt>
+                <c:pt idx="1">
+                  <c:v>Moderate</c:v>
+                </c:pt>
+                <c:pt idx="2">
+                  <c:v>Major </c:v>
+                </c:pt>
+                <c:pt idx="3">
+                  <c:v>Critical</c:v>
+                </c:pt>
+                <c:pt idx="4">
+                  <c:v>Cosmetic</c:v>
+                </c:pt>
+              </c:strCache>
+            </c:strRef>
+          </c:cat>
+          <c:val>
+            <c:numRef>
+              <c:f>'Test Cases'!$U$25:$U$29</c:f>
+              <c:numCache>
+                <c:formatCode>General</c:formatCode>
+                <c:ptCount val="5"/>
+                <c:pt idx="0">
+                  <c:v>2</c:v>
+                </c:pt>
+                <c:pt idx="1">
+                  <c:v>0</c:v>
+                </c:pt>
+                <c:pt idx="2">
+                  <c:v>0</c:v>
+                </c:pt>
+                <c:pt idx="3">
+                  <c:v>0</c:v>
+                </c:pt>
+                <c:pt idx="4">
+                  <c:v>2</c:v>
+                </c:pt>
+              </c:numCache>
+            </c:numRef>
+          </c:val>
+        </c:ser>
+        <c:dLbls>
+          <c:showLegendKey val="0"/>
+          <c:showVal val="0"/>
+          <c:showCatName val="0"/>
+          <c:showSerName val="0"/>
+          <c:showPercent val="0"/>
+          <c:showBubbleSize val="0"/>
+        </c:dLbls>
+        <c:gapWidth val="150"/>
+        <c:axId val="164132704"/>
+        <c:axId val="164133880"/>
+      </c:barChart>
+      <c:catAx>
+        <c:axId val="164132704"/>
+        <c:scaling>
+          <c:orientation val="minMax"/>
+        </c:scaling>
+        <c:delete val="0"/>
+        <c:axPos val="b"/>
+        <c:numFmt formatCode="General" sourceLinked="0"/>
+        <c:majorTickMark val="out"/>
+        <c:minorTickMark val="none"/>
+        <c:tickLblPos val="nextTo"/>
+        <c:crossAx val="164133880"/>
+        <c:crosses val="autoZero"/>
+        <c:auto val="1"/>
+        <c:lblAlgn val="ctr"/>
+        <c:lblOffset val="100"/>
+        <c:noMultiLvlLbl val="0"/>
+      </c:catAx>
+      <c:valAx>
+        <c:axId val="164133880"/>
+        <c:scaling>
+          <c:orientation val="minMax"/>
+        </c:scaling>
+        <c:delete val="0"/>
+        <c:axPos val="l"/>
+        <c:majorGridlines/>
+        <c:numFmt formatCode="General" sourceLinked="1"/>
+        <c:majorTickMark val="out"/>
+        <c:minorTickMark val="none"/>
+        <c:tickLblPos val="nextTo"/>
+        <c:crossAx val="164132704"/>
+        <c:crosses val="autoZero"/>
+        <c:crossBetween val="between"/>
+      </c:valAx>
+    </c:plotArea>
+    <c:plotVisOnly val="1"/>
+    <c:dispBlanksAs val="gap"/>
+    <c:showDLblsOverMax val="0"/>
+  </c:chart>
+  <c:externalData r:id="rId1">
+    <c:autoUpdate val="0"/>
+  </c:externalData>
+</c:chartSpace>
 </file>
 
 <file path=ppt/slideLayouts/slideLayout1.xml><?xml version="1.0" encoding="utf-8"?>
@@ -238,7 +383,7 @@
           <a:p>
             <a:fld id="{D3698C4E-6CFC-4B3C-9E4E-2B29E17CB3DD}" type="datetimeFigureOut">
               <a:rPr lang="en-GB" smtClean="0"/>
-              <a:t>27/04/2015</a:t>
+              <a:t>28/04/2015</a:t>
             </a:fld>
             <a:endParaRPr lang="en-GB"/>
           </a:p>
@@ -408,7 +553,7 @@
           <a:p>
             <a:fld id="{D3698C4E-6CFC-4B3C-9E4E-2B29E17CB3DD}" type="datetimeFigureOut">
               <a:rPr lang="en-GB" smtClean="0"/>
-              <a:t>27/04/2015</a:t>
+              <a:t>28/04/2015</a:t>
             </a:fld>
             <a:endParaRPr lang="en-GB"/>
           </a:p>
@@ -588,7 +733,7 @@
           <a:p>
             <a:fld id="{D3698C4E-6CFC-4B3C-9E4E-2B29E17CB3DD}" type="datetimeFigureOut">
               <a:rPr lang="en-GB" smtClean="0"/>
-              <a:t>27/04/2015</a:t>
+              <a:t>28/04/2015</a:t>
             </a:fld>
             <a:endParaRPr lang="en-GB"/>
           </a:p>
@@ -758,7 +903,7 @@
           <a:p>
             <a:fld id="{D3698C4E-6CFC-4B3C-9E4E-2B29E17CB3DD}" type="datetimeFigureOut">
               <a:rPr lang="en-GB" smtClean="0"/>
-              <a:t>27/04/2015</a:t>
+              <a:t>28/04/2015</a:t>
             </a:fld>
             <a:endParaRPr lang="en-GB"/>
           </a:p>
@@ -1004,7 +1149,7 @@
           <a:p>
             <a:fld id="{D3698C4E-6CFC-4B3C-9E4E-2B29E17CB3DD}" type="datetimeFigureOut">
               <a:rPr lang="en-GB" smtClean="0"/>
-              <a:t>27/04/2015</a:t>
+              <a:t>28/04/2015</a:t>
             </a:fld>
             <a:endParaRPr lang="en-GB"/>
           </a:p>
@@ -1236,7 +1381,7 @@
           <a:p>
             <a:fld id="{D3698C4E-6CFC-4B3C-9E4E-2B29E17CB3DD}" type="datetimeFigureOut">
               <a:rPr lang="en-GB" smtClean="0"/>
-              <a:t>27/04/2015</a:t>
+              <a:t>28/04/2015</a:t>
             </a:fld>
             <a:endParaRPr lang="en-GB"/>
           </a:p>
@@ -1603,7 +1748,7 @@
           <a:p>
             <a:fld id="{D3698C4E-6CFC-4B3C-9E4E-2B29E17CB3DD}" type="datetimeFigureOut">
               <a:rPr lang="en-GB" smtClean="0"/>
-              <a:t>27/04/2015</a:t>
+              <a:t>28/04/2015</a:t>
             </a:fld>
             <a:endParaRPr lang="en-GB"/>
           </a:p>
@@ -1721,7 +1866,7 @@
           <a:p>
             <a:fld id="{D3698C4E-6CFC-4B3C-9E4E-2B29E17CB3DD}" type="datetimeFigureOut">
               <a:rPr lang="en-GB" smtClean="0"/>
-              <a:t>27/04/2015</a:t>
+              <a:t>28/04/2015</a:t>
             </a:fld>
             <a:endParaRPr lang="en-GB"/>
           </a:p>
@@ -1816,7 +1961,7 @@
           <a:p>
             <a:fld id="{D3698C4E-6CFC-4B3C-9E4E-2B29E17CB3DD}" type="datetimeFigureOut">
               <a:rPr lang="en-GB" smtClean="0"/>
-              <a:t>27/04/2015</a:t>
+              <a:t>28/04/2015</a:t>
             </a:fld>
             <a:endParaRPr lang="en-GB"/>
           </a:p>
@@ -2093,7 +2238,7 @@
           <a:p>
             <a:fld id="{D3698C4E-6CFC-4B3C-9E4E-2B29E17CB3DD}" type="datetimeFigureOut">
               <a:rPr lang="en-GB" smtClean="0"/>
-              <a:t>27/04/2015</a:t>
+              <a:t>28/04/2015</a:t>
             </a:fld>
             <a:endParaRPr lang="en-GB"/>
           </a:p>
@@ -2346,7 +2491,7 @@
           <a:p>
             <a:fld id="{D3698C4E-6CFC-4B3C-9E4E-2B29E17CB3DD}" type="datetimeFigureOut">
               <a:rPr lang="en-GB" smtClean="0"/>
-              <a:t>27/04/2015</a:t>
+              <a:t>28/04/2015</a:t>
             </a:fld>
             <a:endParaRPr lang="en-GB"/>
           </a:p>
@@ -2559,7 +2704,7 @@
           <a:p>
             <a:fld id="{D3698C4E-6CFC-4B3C-9E4E-2B29E17CB3DD}" type="datetimeFigureOut">
               <a:rPr lang="en-GB" smtClean="0"/>
-              <a:t>27/04/2015</a:t>
+              <a:t>28/04/2015</a:t>
             </a:fld>
             <a:endParaRPr lang="en-GB"/>
           </a:p>
@@ -3143,6 +3288,30 @@
           </a:prstGeom>
         </p:spPr>
       </p:pic>
+      <p:graphicFrame>
+        <p:nvGraphicFramePr>
+          <p:cNvPr id="12" name="Chart 11"/>
+          <p:cNvGraphicFramePr>
+            <a:graphicFrameLocks/>
+          </p:cNvGraphicFramePr>
+          <p:nvPr>
+            <p:extLst>
+              <p:ext uri="{D42A27DB-BD31-4B8C-83A1-F6EECF244321}">
+                <p14:modId xmlns:p14="http://schemas.microsoft.com/office/powerpoint/2010/main" val="4161524544"/>
+              </p:ext>
+            </p:extLst>
+          </p:nvPr>
+        </p:nvGraphicFramePr>
+        <p:xfrm>
+          <a:off x="1746347" y="4337914"/>
+          <a:ext cx="4098498" cy="2090876"/>
+        </p:xfrm>
+        <a:graphic>
+          <a:graphicData uri="http://schemas.openxmlformats.org/drawingml/2006/chart">
+            <c:chart xmlns:c="http://schemas.openxmlformats.org/drawingml/2006/chart" xmlns:r="http://schemas.openxmlformats.org/officeDocument/2006/relationships" r:id="rId5"/>
+          </a:graphicData>
+        </a:graphic>
+      </p:graphicFrame>
     </p:spTree>
     <p:extLst>
       <p:ext uri="{BB962C8B-B14F-4D97-AF65-F5344CB8AC3E}">

</xml_diff>